<commit_message>
Xong quyển báo cáo
</commit_message>
<xml_diff>
--- a/Reports/Presentation.pptx
+++ b/Reports/Presentation.pptx
@@ -2934,6 +2934,13 @@
         </dgm:presLayoutVars>
       </dgm:prSet>
       <dgm:spPr/>
+      <dgm:t>
+        <a:bodyPr/>
+        <a:lstStyle/>
+        <a:p>
+          <a:endParaRPr lang="en-US"/>
+        </a:p>
+      </dgm:t>
     </dgm:pt>
     <dgm:pt modelId="{576F1D14-CE10-4125-9A10-40DBCAE0318C}" type="pres">
       <dgm:prSet presAssocID="{7B911C67-A5A2-465A-B3BF-ABF6E9167C92}" presName="radial" presStyleCnt="0">
@@ -3031,19 +3038,19 @@
     </dgm:pt>
   </dgm:ptLst>
   <dgm:cxnLst>
+    <dgm:cxn modelId="{9C9EB9D2-431E-4281-9B5A-719E16C35251}" srcId="{E61CFC45-6F81-4EB9-8639-E83A6B789196}" destId="{6E7D2C44-CD0C-4176-A764-7227DB299F72}" srcOrd="0" destOrd="0" parTransId="{E811CA9D-51C7-449D-BAD1-24B41A995037}" sibTransId="{41079909-8DD4-44B9-B6B8-B44D53B85560}"/>
+    <dgm:cxn modelId="{DB9C1A22-313E-42B0-8F7B-658EB2874C0E}" type="presOf" srcId="{A0C09EB0-8F60-4E71-9B9D-42FDAF410AF7}" destId="{A6BA83EB-9EB0-45BB-84B0-115EAD0EE6E5}" srcOrd="0" destOrd="0" presId="urn:microsoft.com/office/officeart/2005/8/layout/radial3"/>
+    <dgm:cxn modelId="{F2A2EBB3-BFD1-4E68-A03E-5503707FA208}" type="presOf" srcId="{6E7D2C44-CD0C-4176-A764-7227DB299F72}" destId="{850787EF-5042-4D51-968A-814A74DAA956}" srcOrd="0" destOrd="0" presId="urn:microsoft.com/office/officeart/2005/8/layout/radial3"/>
     <dgm:cxn modelId="{E21525A4-2068-4302-922F-A938EF5D43F0}" type="presOf" srcId="{E61CFC45-6F81-4EB9-8639-E83A6B789196}" destId="{4672A84E-93BC-4F41-AECC-C6F10BA7A492}" srcOrd="0" destOrd="0" presId="urn:microsoft.com/office/officeart/2005/8/layout/radial3"/>
     <dgm:cxn modelId="{671719E5-D387-40AB-ADC7-B9903C818BE5}" type="presOf" srcId="{7B9EC8D6-EB96-481A-A986-3E1B57CC6BA7}" destId="{FDE173F1-C4C8-4FAE-9E6D-9A14DB72A643}" srcOrd="0" destOrd="0" presId="urn:microsoft.com/office/officeart/2005/8/layout/radial3"/>
-    <dgm:cxn modelId="{6008A14C-A9A8-45A6-940A-8B030FA83B53}" type="presOf" srcId="{88AC552A-6715-4788-B2FF-A5C4A5A3478F}" destId="{F8B60E71-582D-4FAA-9554-01FB09296C63}" srcOrd="0" destOrd="0" presId="urn:microsoft.com/office/officeart/2005/8/layout/radial3"/>
     <dgm:cxn modelId="{AE5117DC-311F-4C89-9F7E-AC8946B58695}" srcId="{E61CFC45-6F81-4EB9-8639-E83A6B789196}" destId="{A8068674-CFE3-4322-AEFE-3D8BC748C9F2}" srcOrd="3" destOrd="0" parTransId="{6D833EB9-317F-4700-B4A7-292959D8BCC2}" sibTransId="{F9DDEB76-EDFD-49B8-BDB3-F3E454CD540C}"/>
-    <dgm:cxn modelId="{F2A2EBB3-BFD1-4E68-A03E-5503707FA208}" type="presOf" srcId="{6E7D2C44-CD0C-4176-A764-7227DB299F72}" destId="{850787EF-5042-4D51-968A-814A74DAA956}" srcOrd="0" destOrd="0" presId="urn:microsoft.com/office/officeart/2005/8/layout/radial3"/>
-    <dgm:cxn modelId="{2BAAD668-AE5B-4149-933F-3A58F5AC283B}" type="presOf" srcId="{7B911C67-A5A2-465A-B3BF-ABF6E9167C92}" destId="{0E86EBE6-DEFC-442E-B8C9-DB2077D51829}" srcOrd="0" destOrd="0" presId="urn:microsoft.com/office/officeart/2005/8/layout/radial3"/>
-    <dgm:cxn modelId="{DB9C1A22-313E-42B0-8F7B-658EB2874C0E}" type="presOf" srcId="{A0C09EB0-8F60-4E71-9B9D-42FDAF410AF7}" destId="{A6BA83EB-9EB0-45BB-84B0-115EAD0EE6E5}" srcOrd="0" destOrd="0" presId="urn:microsoft.com/office/officeart/2005/8/layout/radial3"/>
+    <dgm:cxn modelId="{4AA333A7-0DBB-46B1-B5B1-110DFBFD6ADB}" srcId="{E61CFC45-6F81-4EB9-8639-E83A6B789196}" destId="{A0C09EB0-8F60-4E71-9B9D-42FDAF410AF7}" srcOrd="2" destOrd="0" parTransId="{0DF25483-8345-4D48-A118-E80B3EAAFA68}" sibTransId="{BAFE305C-AFA5-4F3F-83A4-8FD91AB24AEC}"/>
+    <dgm:cxn modelId="{DF804132-5FEF-483A-A154-FD2D9BBB158D}" srcId="{7B911C67-A5A2-465A-B3BF-ABF6E9167C92}" destId="{E61CFC45-6F81-4EB9-8639-E83A6B789196}" srcOrd="0" destOrd="0" parTransId="{C014FD26-D164-4503-BD9A-89DF0FB8E2CB}" sibTransId="{8304A016-00E4-423F-8E14-247451EF24AD}"/>
     <dgm:cxn modelId="{C34A80F7-3659-4749-BBE6-6DB5D990756E}" srcId="{E61CFC45-6F81-4EB9-8639-E83A6B789196}" destId="{7B9EC8D6-EB96-481A-A986-3E1B57CC6BA7}" srcOrd="1" destOrd="0" parTransId="{DB7AD97C-8022-4850-9D1A-E6DEDB3C1A42}" sibTransId="{F10C261E-7264-4F45-8C93-D336249A239C}"/>
     <dgm:cxn modelId="{54667F16-6982-475C-8EFE-CB4DF59285C1}" srcId="{E61CFC45-6F81-4EB9-8639-E83A6B789196}" destId="{88AC552A-6715-4788-B2FF-A5C4A5A3478F}" srcOrd="4" destOrd="0" parTransId="{C3ED4ACF-D9A0-4F2E-BB0A-9763E718D8BE}" sibTransId="{47A0E130-1AB9-4312-A601-8E06B8C379D1}"/>
     <dgm:cxn modelId="{D907DE44-1497-4CBB-A034-1DF6E64734AE}" type="presOf" srcId="{A8068674-CFE3-4322-AEFE-3D8BC748C9F2}" destId="{5DA8BA82-8066-4A09-9295-55B5FBECA817}" srcOrd="0" destOrd="0" presId="urn:microsoft.com/office/officeart/2005/8/layout/radial3"/>
-    <dgm:cxn modelId="{DF804132-5FEF-483A-A154-FD2D9BBB158D}" srcId="{7B911C67-A5A2-465A-B3BF-ABF6E9167C92}" destId="{E61CFC45-6F81-4EB9-8639-E83A6B789196}" srcOrd="0" destOrd="0" parTransId="{C014FD26-D164-4503-BD9A-89DF0FB8E2CB}" sibTransId="{8304A016-00E4-423F-8E14-247451EF24AD}"/>
-    <dgm:cxn modelId="{4AA333A7-0DBB-46B1-B5B1-110DFBFD6ADB}" srcId="{E61CFC45-6F81-4EB9-8639-E83A6B789196}" destId="{A0C09EB0-8F60-4E71-9B9D-42FDAF410AF7}" srcOrd="2" destOrd="0" parTransId="{0DF25483-8345-4D48-A118-E80B3EAAFA68}" sibTransId="{BAFE305C-AFA5-4F3F-83A4-8FD91AB24AEC}"/>
-    <dgm:cxn modelId="{9C9EB9D2-431E-4281-9B5A-719E16C35251}" srcId="{E61CFC45-6F81-4EB9-8639-E83A6B789196}" destId="{6E7D2C44-CD0C-4176-A764-7227DB299F72}" srcOrd="0" destOrd="0" parTransId="{E811CA9D-51C7-449D-BAD1-24B41A995037}" sibTransId="{41079909-8DD4-44B9-B6B8-B44D53B85560}"/>
+    <dgm:cxn modelId="{2BAAD668-AE5B-4149-933F-3A58F5AC283B}" type="presOf" srcId="{7B911C67-A5A2-465A-B3BF-ABF6E9167C92}" destId="{0E86EBE6-DEFC-442E-B8C9-DB2077D51829}" srcOrd="0" destOrd="0" presId="urn:microsoft.com/office/officeart/2005/8/layout/radial3"/>
+    <dgm:cxn modelId="{6008A14C-A9A8-45A6-940A-8B030FA83B53}" type="presOf" srcId="{88AC552A-6715-4788-B2FF-A5C4A5A3478F}" destId="{F8B60E71-582D-4FAA-9554-01FB09296C63}" srcOrd="0" destOrd="0" presId="urn:microsoft.com/office/officeart/2005/8/layout/radial3"/>
     <dgm:cxn modelId="{185790EC-4EE6-4B5D-AB58-615DAF02B2C3}" type="presParOf" srcId="{0E86EBE6-DEFC-442E-B8C9-DB2077D51829}" destId="{576F1D14-CE10-4125-9A10-40DBCAE0318C}" srcOrd="0" destOrd="0" presId="urn:microsoft.com/office/officeart/2005/8/layout/radial3"/>
     <dgm:cxn modelId="{AA30DBA1-6547-4098-A6BC-7904EEF63A13}" type="presParOf" srcId="{576F1D14-CE10-4125-9A10-40DBCAE0318C}" destId="{4672A84E-93BC-4F41-AECC-C6F10BA7A492}" srcOrd="0" destOrd="0" presId="urn:microsoft.com/office/officeart/2005/8/layout/radial3"/>
     <dgm:cxn modelId="{EC7C207A-055C-454B-AD8A-40C658C0305D}" type="presParOf" srcId="{576F1D14-CE10-4125-9A10-40DBCAE0318C}" destId="{850787EF-5042-4D51-968A-814A74DAA956}" srcOrd="1" destOrd="0" presId="urn:microsoft.com/office/officeart/2005/8/layout/radial3"/>
@@ -3234,14 +3241,35 @@
         </dgm:presLayoutVars>
       </dgm:prSet>
       <dgm:spPr/>
+      <dgm:t>
+        <a:bodyPr/>
+        <a:lstStyle/>
+        <a:p>
+          <a:endParaRPr lang="en-US"/>
+        </a:p>
+      </dgm:t>
     </dgm:pt>
     <dgm:pt modelId="{B8F6A591-8DF1-4CCC-B12C-A99C8B3FEFAB}" type="pres">
       <dgm:prSet presAssocID="{97A8CF2D-F3D1-42DB-802A-011413263594}" presName="centerShape" presStyleLbl="node0" presStyleIdx="0" presStyleCnt="1"/>
       <dgm:spPr/>
+      <dgm:t>
+        <a:bodyPr/>
+        <a:lstStyle/>
+        <a:p>
+          <a:endParaRPr lang="en-US"/>
+        </a:p>
+      </dgm:t>
     </dgm:pt>
     <dgm:pt modelId="{1FEABB09-25A5-432F-9911-10478EF95599}" type="pres">
       <dgm:prSet presAssocID="{125551CD-A054-45BD-AE5C-3D212C3D8526}" presName="parTrans" presStyleLbl="bgSibTrans2D1" presStyleIdx="0" presStyleCnt="3"/>
       <dgm:spPr/>
+      <dgm:t>
+        <a:bodyPr/>
+        <a:lstStyle/>
+        <a:p>
+          <a:endParaRPr lang="en-US"/>
+        </a:p>
+      </dgm:t>
     </dgm:pt>
     <dgm:pt modelId="{C92C280C-2205-4306-82DF-4CA179D8E44F}" type="pres">
       <dgm:prSet presAssocID="{480DCC3E-0D26-4CE3-BE9D-AB2E29DAAECF}" presName="node" presStyleLbl="node1" presStyleIdx="0" presStyleCnt="3">
@@ -3261,6 +3289,13 @@
     <dgm:pt modelId="{88511A48-A615-49FE-9DD2-D3313D7B4BD0}" type="pres">
       <dgm:prSet presAssocID="{9150135A-D080-43BD-B251-1034FC04A45E}" presName="parTrans" presStyleLbl="bgSibTrans2D1" presStyleIdx="1" presStyleCnt="3"/>
       <dgm:spPr/>
+      <dgm:t>
+        <a:bodyPr/>
+        <a:lstStyle/>
+        <a:p>
+          <a:endParaRPr lang="en-US"/>
+        </a:p>
+      </dgm:t>
     </dgm:pt>
     <dgm:pt modelId="{C3F546A9-636E-412E-8201-0B638FB5B99B}" type="pres">
       <dgm:prSet presAssocID="{4BDC7673-A42C-4621-9399-616535236CC8}" presName="node" presStyleLbl="node1" presStyleIdx="1" presStyleCnt="3">
@@ -3280,6 +3315,13 @@
     <dgm:pt modelId="{4A1E67AE-D3D8-4DE3-B74F-BA402934B99D}" type="pres">
       <dgm:prSet presAssocID="{575CA7F4-7741-4027-BBE0-0E43B46020D7}" presName="parTrans" presStyleLbl="bgSibTrans2D1" presStyleIdx="2" presStyleCnt="3"/>
       <dgm:spPr/>
+      <dgm:t>
+        <a:bodyPr/>
+        <a:lstStyle/>
+        <a:p>
+          <a:endParaRPr lang="en-US"/>
+        </a:p>
+      </dgm:t>
     </dgm:pt>
     <dgm:pt modelId="{DBE4DC52-6236-41D9-AD06-5D1262CDAD0C}" type="pres">
       <dgm:prSet presAssocID="{ECB4FBAF-2471-4663-B765-BAF056C4784D}" presName="node" presStyleLbl="node1" presStyleIdx="2" presStyleCnt="3">
@@ -3298,18 +3340,18 @@
     </dgm:pt>
   </dgm:ptLst>
   <dgm:cxnLst>
-    <dgm:cxn modelId="{0E171844-3223-4F79-83A5-BEA6216626B1}" type="presOf" srcId="{125551CD-A054-45BD-AE5C-3D212C3D8526}" destId="{1FEABB09-25A5-432F-9911-10478EF95599}" srcOrd="0" destOrd="0" presId="urn:microsoft.com/office/officeart/2005/8/layout/radial4"/>
-    <dgm:cxn modelId="{9A6104FE-0B48-408A-B043-3491E7E89D04}" srcId="{97A8CF2D-F3D1-42DB-802A-011413263594}" destId="{480DCC3E-0D26-4CE3-BE9D-AB2E29DAAECF}" srcOrd="0" destOrd="0" parTransId="{125551CD-A054-45BD-AE5C-3D212C3D8526}" sibTransId="{45BD0C8D-D577-4D14-BD44-831788EC63C0}"/>
-    <dgm:cxn modelId="{76333900-AD73-4591-B887-5088FDD7DB80}" type="presOf" srcId="{480DCC3E-0D26-4CE3-BE9D-AB2E29DAAECF}" destId="{C92C280C-2205-4306-82DF-4CA179D8E44F}" srcOrd="0" destOrd="0" presId="urn:microsoft.com/office/officeart/2005/8/layout/radial4"/>
-    <dgm:cxn modelId="{967B96D3-8F28-4387-B2D3-8BCCD603B8B2}" srcId="{B3A8031C-49C3-48B3-A3AC-00F29EFAA4F9}" destId="{97A8CF2D-F3D1-42DB-802A-011413263594}" srcOrd="0" destOrd="0" parTransId="{FFA0F785-BF69-4BA2-9579-D3AE3EEEC425}" sibTransId="{C9822A57-00E0-4B78-88B5-BD433A53D534}"/>
-    <dgm:cxn modelId="{C679C330-68F0-4FBB-BE8E-396D89A4C361}" type="presOf" srcId="{B3A8031C-49C3-48B3-A3AC-00F29EFAA4F9}" destId="{3F7D9CE9-7E06-47BE-B403-D8E7FB7AB796}" srcOrd="0" destOrd="0" presId="urn:microsoft.com/office/officeart/2005/8/layout/radial4"/>
     <dgm:cxn modelId="{4903B02D-5621-4BA9-B581-7B8AAD731449}" type="presOf" srcId="{9150135A-D080-43BD-B251-1034FC04A45E}" destId="{88511A48-A615-49FE-9DD2-D3313D7B4BD0}" srcOrd="0" destOrd="0" presId="urn:microsoft.com/office/officeart/2005/8/layout/radial4"/>
     <dgm:cxn modelId="{A384CC07-906C-43CA-9498-818142B85801}" srcId="{97A8CF2D-F3D1-42DB-802A-011413263594}" destId="{ECB4FBAF-2471-4663-B765-BAF056C4784D}" srcOrd="2" destOrd="0" parTransId="{575CA7F4-7741-4027-BBE0-0E43B46020D7}" sibTransId="{704F112D-BFA4-4BEE-BE3D-F941BF0A7DB3}"/>
+    <dgm:cxn modelId="{29208011-F73A-4E3F-BEFD-5855BB658293}" type="presOf" srcId="{4BDC7673-A42C-4621-9399-616535236CC8}" destId="{C3F546A9-636E-412E-8201-0B638FB5B99B}" srcOrd="0" destOrd="0" presId="urn:microsoft.com/office/officeart/2005/8/layout/radial4"/>
     <dgm:cxn modelId="{112D801D-B3BA-4E10-8225-86ED989596DB}" type="presOf" srcId="{ECB4FBAF-2471-4663-B765-BAF056C4784D}" destId="{DBE4DC52-6236-41D9-AD06-5D1262CDAD0C}" srcOrd="0" destOrd="0" presId="urn:microsoft.com/office/officeart/2005/8/layout/radial4"/>
-    <dgm:cxn modelId="{29208011-F73A-4E3F-BEFD-5855BB658293}" type="presOf" srcId="{4BDC7673-A42C-4621-9399-616535236CC8}" destId="{C3F546A9-636E-412E-8201-0B638FB5B99B}" srcOrd="0" destOrd="0" presId="urn:microsoft.com/office/officeart/2005/8/layout/radial4"/>
+    <dgm:cxn modelId="{281649F7-BE1F-4B56-B1DA-591E6B37A9FB}" srcId="{97A8CF2D-F3D1-42DB-802A-011413263594}" destId="{4BDC7673-A42C-4621-9399-616535236CC8}" srcOrd="1" destOrd="0" parTransId="{9150135A-D080-43BD-B251-1034FC04A45E}" sibTransId="{2463F12D-E9D1-4F93-A1DC-C7A0FB5484AB}"/>
+    <dgm:cxn modelId="{76333900-AD73-4591-B887-5088FDD7DB80}" type="presOf" srcId="{480DCC3E-0D26-4CE3-BE9D-AB2E29DAAECF}" destId="{C92C280C-2205-4306-82DF-4CA179D8E44F}" srcOrd="0" destOrd="0" presId="urn:microsoft.com/office/officeart/2005/8/layout/radial4"/>
     <dgm:cxn modelId="{BECDFC7A-3779-4B16-9F23-EA40470FFBFD}" type="presOf" srcId="{575CA7F4-7741-4027-BBE0-0E43B46020D7}" destId="{4A1E67AE-D3D8-4DE3-B74F-BA402934B99D}" srcOrd="0" destOrd="0" presId="urn:microsoft.com/office/officeart/2005/8/layout/radial4"/>
-    <dgm:cxn modelId="{281649F7-BE1F-4B56-B1DA-591E6B37A9FB}" srcId="{97A8CF2D-F3D1-42DB-802A-011413263594}" destId="{4BDC7673-A42C-4621-9399-616535236CC8}" srcOrd="1" destOrd="0" parTransId="{9150135A-D080-43BD-B251-1034FC04A45E}" sibTransId="{2463F12D-E9D1-4F93-A1DC-C7A0FB5484AB}"/>
     <dgm:cxn modelId="{CDED937D-D669-4E80-A21D-179B8AC1E217}" type="presOf" srcId="{97A8CF2D-F3D1-42DB-802A-011413263594}" destId="{B8F6A591-8DF1-4CCC-B12C-A99C8B3FEFAB}" srcOrd="0" destOrd="0" presId="urn:microsoft.com/office/officeart/2005/8/layout/radial4"/>
+    <dgm:cxn modelId="{0E171844-3223-4F79-83A5-BEA6216626B1}" type="presOf" srcId="{125551CD-A054-45BD-AE5C-3D212C3D8526}" destId="{1FEABB09-25A5-432F-9911-10478EF95599}" srcOrd="0" destOrd="0" presId="urn:microsoft.com/office/officeart/2005/8/layout/radial4"/>
+    <dgm:cxn modelId="{C679C330-68F0-4FBB-BE8E-396D89A4C361}" type="presOf" srcId="{B3A8031C-49C3-48B3-A3AC-00F29EFAA4F9}" destId="{3F7D9CE9-7E06-47BE-B403-D8E7FB7AB796}" srcOrd="0" destOrd="0" presId="urn:microsoft.com/office/officeart/2005/8/layout/radial4"/>
+    <dgm:cxn modelId="{967B96D3-8F28-4387-B2D3-8BCCD603B8B2}" srcId="{B3A8031C-49C3-48B3-A3AC-00F29EFAA4F9}" destId="{97A8CF2D-F3D1-42DB-802A-011413263594}" srcOrd="0" destOrd="0" parTransId="{FFA0F785-BF69-4BA2-9579-D3AE3EEEC425}" sibTransId="{C9822A57-00E0-4B78-88B5-BD433A53D534}"/>
+    <dgm:cxn modelId="{9A6104FE-0B48-408A-B043-3491E7E89D04}" srcId="{97A8CF2D-F3D1-42DB-802A-011413263594}" destId="{480DCC3E-0D26-4CE3-BE9D-AB2E29DAAECF}" srcOrd="0" destOrd="0" parTransId="{125551CD-A054-45BD-AE5C-3D212C3D8526}" sibTransId="{45BD0C8D-D577-4D14-BD44-831788EC63C0}"/>
     <dgm:cxn modelId="{95974D2C-32CE-4EE7-A875-7A0218124DE6}" type="presParOf" srcId="{3F7D9CE9-7E06-47BE-B403-D8E7FB7AB796}" destId="{B8F6A591-8DF1-4CCC-B12C-A99C8B3FEFAB}" srcOrd="0" destOrd="0" presId="urn:microsoft.com/office/officeart/2005/8/layout/radial4"/>
     <dgm:cxn modelId="{49D60D19-06D4-4986-98EA-2F4CFC219251}" type="presParOf" srcId="{3F7D9CE9-7E06-47BE-B403-D8E7FB7AB796}" destId="{1FEABB09-25A5-432F-9911-10478EF95599}" srcOrd="1" destOrd="0" presId="urn:microsoft.com/office/officeart/2005/8/layout/radial4"/>
     <dgm:cxn modelId="{46F37375-336F-4968-811C-CE668FC97E92}" type="presParOf" srcId="{3F7D9CE9-7E06-47BE-B403-D8E7FB7AB796}" destId="{C92C280C-2205-4306-82DF-4CA179D8E44F}" srcOrd="2" destOrd="0" presId="urn:microsoft.com/office/officeart/2005/8/layout/radial4"/>
@@ -3570,6 +3612,13 @@
         </dgm:presLayoutVars>
       </dgm:prSet>
       <dgm:spPr/>
+      <dgm:t>
+        <a:bodyPr/>
+        <a:lstStyle/>
+        <a:p>
+          <a:endParaRPr lang="en-US"/>
+        </a:p>
+      </dgm:t>
     </dgm:pt>
     <dgm:pt modelId="{448B54B7-CC67-4A97-93B9-B87E8F360148}" type="pres">
       <dgm:prSet presAssocID="{213B2254-3991-42C4-8998-6ABA1E12FAFB}" presName="text1" presStyleCnt="0"/>
@@ -3584,6 +3633,13 @@
         </dgm:presLayoutVars>
       </dgm:prSet>
       <dgm:spPr/>
+      <dgm:t>
+        <a:bodyPr/>
+        <a:lstStyle/>
+        <a:p>
+          <a:endParaRPr lang="en-US"/>
+        </a:p>
+      </dgm:t>
     </dgm:pt>
     <dgm:pt modelId="{E3984E7A-7464-4FDE-B66B-30F79A57B79B}" type="pres">
       <dgm:prSet presAssocID="{213B2254-3991-42C4-8998-6ABA1E12FAFB}" presName="textaccent1" presStyleCnt="0"/>
@@ -3600,6 +3656,13 @@
     <dgm:pt modelId="{91FE58EE-DA0D-40CD-9E0A-59B7FC0B4DB2}" type="pres">
       <dgm:prSet presAssocID="{A4918358-9999-465D-A63B-5DD56E2CB518}" presName="imageRepeatNode" presStyleLbl="alignAcc1" presStyleIdx="0" presStyleCnt="5"/>
       <dgm:spPr/>
+      <dgm:t>
+        <a:bodyPr/>
+        <a:lstStyle/>
+        <a:p>
+          <a:endParaRPr lang="en-US"/>
+        </a:p>
+      </dgm:t>
     </dgm:pt>
     <dgm:pt modelId="{F3E4177A-C738-4259-B938-7049B064B71E}" type="pres">
       <dgm:prSet presAssocID="{A4918358-9999-465D-A63B-5DD56E2CB518}" presName="imageaccent1" presStyleCnt="0"/>
@@ -3622,6 +3685,13 @@
         </dgm:presLayoutVars>
       </dgm:prSet>
       <dgm:spPr/>
+      <dgm:t>
+        <a:bodyPr/>
+        <a:lstStyle/>
+        <a:p>
+          <a:endParaRPr lang="en-US"/>
+        </a:p>
+      </dgm:t>
     </dgm:pt>
     <dgm:pt modelId="{62F5C092-D5CA-47CA-9A98-EC2718A36D08}" type="pres">
       <dgm:prSet presAssocID="{D899232F-7569-42F7-919E-38DB7A927DF1}" presName="textaccent2" presStyleCnt="0"/>
@@ -3638,6 +3708,13 @@
     <dgm:pt modelId="{1024197E-0887-4027-95A8-4F16CED73A11}" type="pres">
       <dgm:prSet presAssocID="{D9CB2E9C-1E77-42E5-AA2B-9B9444EC37C4}" presName="imageRepeatNode" presStyleLbl="alignAcc1" presStyleIdx="1" presStyleCnt="5"/>
       <dgm:spPr/>
+      <dgm:t>
+        <a:bodyPr/>
+        <a:lstStyle/>
+        <a:p>
+          <a:endParaRPr lang="en-US"/>
+        </a:p>
+      </dgm:t>
     </dgm:pt>
     <dgm:pt modelId="{0894A2F5-1891-4F46-9D95-CFA7DFD6727B}" type="pres">
       <dgm:prSet presAssocID="{D9CB2E9C-1E77-42E5-AA2B-9B9444EC37C4}" presName="imageaccent2" presStyleCnt="0"/>
@@ -3660,6 +3737,13 @@
         </dgm:presLayoutVars>
       </dgm:prSet>
       <dgm:spPr/>
+      <dgm:t>
+        <a:bodyPr/>
+        <a:lstStyle/>
+        <a:p>
+          <a:endParaRPr lang="en-US"/>
+        </a:p>
+      </dgm:t>
     </dgm:pt>
     <dgm:pt modelId="{98523543-0B4B-453A-AC82-A1241E722E14}" type="pres">
       <dgm:prSet presAssocID="{26BDA26C-DA63-43A3-9A94-EFAC30646E91}" presName="textaccent3" presStyleCnt="0"/>
@@ -3676,6 +3760,13 @@
     <dgm:pt modelId="{D2FB48D5-076B-496F-AC66-5A5D8815B643}" type="pres">
       <dgm:prSet presAssocID="{1FC739A1-0545-4DF5-A10D-1E88ECF69537}" presName="imageRepeatNode" presStyleLbl="alignAcc1" presStyleIdx="2" presStyleCnt="5"/>
       <dgm:spPr/>
+      <dgm:t>
+        <a:bodyPr/>
+        <a:lstStyle/>
+        <a:p>
+          <a:endParaRPr lang="en-US"/>
+        </a:p>
+      </dgm:t>
     </dgm:pt>
     <dgm:pt modelId="{366115AB-4AB0-4016-9EC9-0FA65621D274}" type="pres">
       <dgm:prSet presAssocID="{1FC739A1-0545-4DF5-A10D-1E88ECF69537}" presName="imageaccent3" presStyleCnt="0"/>
@@ -3698,6 +3789,13 @@
         </dgm:presLayoutVars>
       </dgm:prSet>
       <dgm:spPr/>
+      <dgm:t>
+        <a:bodyPr/>
+        <a:lstStyle/>
+        <a:p>
+          <a:endParaRPr lang="en-US"/>
+        </a:p>
+      </dgm:t>
     </dgm:pt>
     <dgm:pt modelId="{0A42C4FD-8098-4AF0-A826-EC4442BC0952}" type="pres">
       <dgm:prSet presAssocID="{F42543D4-1290-4352-8728-2D0AB0D96610}" presName="textaccent4" presStyleCnt="0"/>
@@ -3714,6 +3812,13 @@
     <dgm:pt modelId="{23242E47-3A57-409E-8235-91CB5F9E9E58}" type="pres">
       <dgm:prSet presAssocID="{9F96DDC4-B0AE-4D0D-A70F-D3C1DE78AB54}" presName="imageRepeatNode" presStyleLbl="alignAcc1" presStyleIdx="3" presStyleCnt="5"/>
       <dgm:spPr/>
+      <dgm:t>
+        <a:bodyPr/>
+        <a:lstStyle/>
+        <a:p>
+          <a:endParaRPr lang="en-US"/>
+        </a:p>
+      </dgm:t>
     </dgm:pt>
     <dgm:pt modelId="{7895924B-A4FC-4BD5-95B6-D7915ECA591C}" type="pres">
       <dgm:prSet presAssocID="{9F96DDC4-B0AE-4D0D-A70F-D3C1DE78AB54}" presName="imageaccent4" presStyleCnt="0"/>
@@ -3736,6 +3841,13 @@
         </dgm:presLayoutVars>
       </dgm:prSet>
       <dgm:spPr/>
+      <dgm:t>
+        <a:bodyPr/>
+        <a:lstStyle/>
+        <a:p>
+          <a:endParaRPr lang="en-US"/>
+        </a:p>
+      </dgm:t>
     </dgm:pt>
     <dgm:pt modelId="{0C1E19E8-1B9C-4800-BD49-9BD97F94E69C}" type="pres">
       <dgm:prSet presAssocID="{43F7F75E-9212-4C27-A5AC-5A9C4A146C1C}" presName="textaccent5" presStyleCnt="0"/>
@@ -3752,6 +3864,13 @@
     <dgm:pt modelId="{768D2F35-A00E-4B99-B402-89EB2FE2121A}" type="pres">
       <dgm:prSet presAssocID="{29068DD7-B4C5-4E27-A39A-6C71A920C832}" presName="imageRepeatNode" presStyleLbl="alignAcc1" presStyleIdx="4" presStyleCnt="5"/>
       <dgm:spPr/>
+      <dgm:t>
+        <a:bodyPr/>
+        <a:lstStyle/>
+        <a:p>
+          <a:endParaRPr lang="en-US"/>
+        </a:p>
+      </dgm:t>
     </dgm:pt>
     <dgm:pt modelId="{879C3788-DA51-4483-ADD7-93C8F0634C75}" type="pres">
       <dgm:prSet presAssocID="{29068DD7-B4C5-4E27-A39A-6C71A920C832}" presName="imageaccent5" presStyleCnt="0"/>
@@ -3763,22 +3882,22 @@
     </dgm:pt>
   </dgm:ptLst>
   <dgm:cxnLst>
+    <dgm:cxn modelId="{C304C1C7-B2C8-4AD9-8E85-7F28685300B0}" type="presOf" srcId="{213B2254-3991-42C4-8998-6ABA1E12FAFB}" destId="{59890D33-F49B-42EA-8B14-B5038E946509}" srcOrd="0" destOrd="0" presId="urn:microsoft.com/office/officeart/2008/layout/HexagonCluster"/>
+    <dgm:cxn modelId="{CD992B11-7B56-40E4-BD40-24711DA5165C}" type="presOf" srcId="{A4918358-9999-465D-A63B-5DD56E2CB518}" destId="{91FE58EE-DA0D-40CD-9E0A-59B7FC0B4DB2}" srcOrd="0" destOrd="0" presId="urn:microsoft.com/office/officeart/2008/layout/HexagonCluster"/>
+    <dgm:cxn modelId="{3F714CD2-EE19-46CF-A7F2-A500DC8A3C55}" srcId="{BB4BAA05-43A2-4654-B874-DB2EA4DEC263}" destId="{F42543D4-1290-4352-8728-2D0AB0D96610}" srcOrd="3" destOrd="0" parTransId="{A9FE16D1-5F92-4FF6-87C6-075BB91A12E1}" sibTransId="{9F96DDC4-B0AE-4D0D-A70F-D3C1DE78AB54}"/>
+    <dgm:cxn modelId="{4B3151CB-7324-4D80-BA2E-21908507FA05}" srcId="{BB4BAA05-43A2-4654-B874-DB2EA4DEC263}" destId="{43F7F75E-9212-4C27-A5AC-5A9C4A146C1C}" srcOrd="4" destOrd="0" parTransId="{10E65628-EA0D-47EF-9D3A-82E77BA60938}" sibTransId="{29068DD7-B4C5-4E27-A39A-6C71A920C832}"/>
+    <dgm:cxn modelId="{58B2DD48-EA8F-4085-A761-8A9FDE726B30}" type="presOf" srcId="{9F96DDC4-B0AE-4D0D-A70F-D3C1DE78AB54}" destId="{23242E47-3A57-409E-8235-91CB5F9E9E58}" srcOrd="0" destOrd="0" presId="urn:microsoft.com/office/officeart/2008/layout/HexagonCluster"/>
+    <dgm:cxn modelId="{0611FDF7-B185-4A9E-A8F6-3F5607A17DA5}" type="presOf" srcId="{D9CB2E9C-1E77-42E5-AA2B-9B9444EC37C4}" destId="{1024197E-0887-4027-95A8-4F16CED73A11}" srcOrd="0" destOrd="0" presId="urn:microsoft.com/office/officeart/2008/layout/HexagonCluster"/>
+    <dgm:cxn modelId="{BF372B49-FD7E-4F21-B472-A3966D4F7D31}" type="presOf" srcId="{29068DD7-B4C5-4E27-A39A-6C71A920C832}" destId="{768D2F35-A00E-4B99-B402-89EB2FE2121A}" srcOrd="0" destOrd="0" presId="urn:microsoft.com/office/officeart/2008/layout/HexagonCluster"/>
     <dgm:cxn modelId="{473598E1-1299-4048-8E25-2914DDD26CAE}" type="presOf" srcId="{26BDA26C-DA63-43A3-9A94-EFAC30646E91}" destId="{E6139666-278B-4B58-A1EC-3C388EB32939}" srcOrd="0" destOrd="0" presId="urn:microsoft.com/office/officeart/2008/layout/HexagonCluster"/>
-    <dgm:cxn modelId="{6408F82F-F8EF-497A-B5C6-BB14FAEBE3D1}" srcId="{BB4BAA05-43A2-4654-B874-DB2EA4DEC263}" destId="{26BDA26C-DA63-43A3-9A94-EFAC30646E91}" srcOrd="2" destOrd="0" parTransId="{C203EC0B-B0D3-4277-B1CB-B5FFCA944C41}" sibTransId="{1FC739A1-0545-4DF5-A10D-1E88ECF69537}"/>
-    <dgm:cxn modelId="{3FE2B012-FA6B-49F4-B340-F84305C8F0D3}" type="presOf" srcId="{F42543D4-1290-4352-8728-2D0AB0D96610}" destId="{5D2FD51E-1E92-4CEC-A07A-521A73C46183}" srcOrd="0" destOrd="0" presId="urn:microsoft.com/office/officeart/2008/layout/HexagonCluster"/>
-    <dgm:cxn modelId="{3F714CD2-EE19-46CF-A7F2-A500DC8A3C55}" srcId="{BB4BAA05-43A2-4654-B874-DB2EA4DEC263}" destId="{F42543D4-1290-4352-8728-2D0AB0D96610}" srcOrd="3" destOrd="0" parTransId="{A9FE16D1-5F92-4FF6-87C6-075BB91A12E1}" sibTransId="{9F96DDC4-B0AE-4D0D-A70F-D3C1DE78AB54}"/>
-    <dgm:cxn modelId="{3D6CA6D4-10F9-4CE7-AF37-74FD220E763B}" type="presOf" srcId="{1FC739A1-0545-4DF5-A10D-1E88ECF69537}" destId="{D2FB48D5-076B-496F-AC66-5A5D8815B643}" srcOrd="0" destOrd="0" presId="urn:microsoft.com/office/officeart/2008/layout/HexagonCluster"/>
-    <dgm:cxn modelId="{CD992B11-7B56-40E4-BD40-24711DA5165C}" type="presOf" srcId="{A4918358-9999-465D-A63B-5DD56E2CB518}" destId="{91FE58EE-DA0D-40CD-9E0A-59B7FC0B4DB2}" srcOrd="0" destOrd="0" presId="urn:microsoft.com/office/officeart/2008/layout/HexagonCluster"/>
-    <dgm:cxn modelId="{AADA5011-BD13-4C5D-9A51-22CD224555D3}" type="presOf" srcId="{43F7F75E-9212-4C27-A5AC-5A9C4A146C1C}" destId="{B095EC76-60D3-45AA-A46D-D3A00073A03B}" srcOrd="0" destOrd="0" presId="urn:microsoft.com/office/officeart/2008/layout/HexagonCluster"/>
-    <dgm:cxn modelId="{0611FDF7-B185-4A9E-A8F6-3F5607A17DA5}" type="presOf" srcId="{D9CB2E9C-1E77-42E5-AA2B-9B9444EC37C4}" destId="{1024197E-0887-4027-95A8-4F16CED73A11}" srcOrd="0" destOrd="0" presId="urn:microsoft.com/office/officeart/2008/layout/HexagonCluster"/>
-    <dgm:cxn modelId="{CC9577B5-32EE-43BE-A50A-40D188D26144}" type="presOf" srcId="{D899232F-7569-42F7-919E-38DB7A927DF1}" destId="{1DD078E4-963A-459A-A9E8-A7AC36700F89}" srcOrd="0" destOrd="0" presId="urn:microsoft.com/office/officeart/2008/layout/HexagonCluster"/>
-    <dgm:cxn modelId="{C304C1C7-B2C8-4AD9-8E85-7F28685300B0}" type="presOf" srcId="{213B2254-3991-42C4-8998-6ABA1E12FAFB}" destId="{59890D33-F49B-42EA-8B14-B5038E946509}" srcOrd="0" destOrd="0" presId="urn:microsoft.com/office/officeart/2008/layout/HexagonCluster"/>
-    <dgm:cxn modelId="{4B3151CB-7324-4D80-BA2E-21908507FA05}" srcId="{BB4BAA05-43A2-4654-B874-DB2EA4DEC263}" destId="{43F7F75E-9212-4C27-A5AC-5A9C4A146C1C}" srcOrd="4" destOrd="0" parTransId="{10E65628-EA0D-47EF-9D3A-82E77BA60938}" sibTransId="{29068DD7-B4C5-4E27-A39A-6C71A920C832}"/>
-    <dgm:cxn modelId="{57C58147-4BF1-46F1-9ECC-ED6733E0B692}" srcId="{BB4BAA05-43A2-4654-B874-DB2EA4DEC263}" destId="{213B2254-3991-42C4-8998-6ABA1E12FAFB}" srcOrd="0" destOrd="0" parTransId="{EE740E20-DED3-4871-9510-818C8FEE286E}" sibTransId="{A4918358-9999-465D-A63B-5DD56E2CB518}"/>
-    <dgm:cxn modelId="{BF372B49-FD7E-4F21-B472-A3966D4F7D31}" type="presOf" srcId="{29068DD7-B4C5-4E27-A39A-6C71A920C832}" destId="{768D2F35-A00E-4B99-B402-89EB2FE2121A}" srcOrd="0" destOrd="0" presId="urn:microsoft.com/office/officeart/2008/layout/HexagonCluster"/>
-    <dgm:cxn modelId="{58B2DD48-EA8F-4085-A761-8A9FDE726B30}" type="presOf" srcId="{9F96DDC4-B0AE-4D0D-A70F-D3C1DE78AB54}" destId="{23242E47-3A57-409E-8235-91CB5F9E9E58}" srcOrd="0" destOrd="0" presId="urn:microsoft.com/office/officeart/2008/layout/HexagonCluster"/>
     <dgm:cxn modelId="{7AF8FC34-FF43-47E5-9A34-8B1BC95DBE7D}" type="presOf" srcId="{BB4BAA05-43A2-4654-B874-DB2EA4DEC263}" destId="{F65CB6D2-9EE0-4A77-9723-4FF9B2DA763F}" srcOrd="0" destOrd="0" presId="urn:microsoft.com/office/officeart/2008/layout/HexagonCluster"/>
     <dgm:cxn modelId="{2FD59F3A-BE97-4949-A6AF-A1780267E079}" srcId="{BB4BAA05-43A2-4654-B874-DB2EA4DEC263}" destId="{D899232F-7569-42F7-919E-38DB7A927DF1}" srcOrd="1" destOrd="0" parTransId="{791CB3EB-86EF-4FF9-A63C-2277F9BBEF75}" sibTransId="{D9CB2E9C-1E77-42E5-AA2B-9B9444EC37C4}"/>
+    <dgm:cxn modelId="{57C58147-4BF1-46F1-9ECC-ED6733E0B692}" srcId="{BB4BAA05-43A2-4654-B874-DB2EA4DEC263}" destId="{213B2254-3991-42C4-8998-6ABA1E12FAFB}" srcOrd="0" destOrd="0" parTransId="{EE740E20-DED3-4871-9510-818C8FEE286E}" sibTransId="{A4918358-9999-465D-A63B-5DD56E2CB518}"/>
+    <dgm:cxn modelId="{CC9577B5-32EE-43BE-A50A-40D188D26144}" type="presOf" srcId="{D899232F-7569-42F7-919E-38DB7A927DF1}" destId="{1DD078E4-963A-459A-A9E8-A7AC36700F89}" srcOrd="0" destOrd="0" presId="urn:microsoft.com/office/officeart/2008/layout/HexagonCluster"/>
+    <dgm:cxn modelId="{AADA5011-BD13-4C5D-9A51-22CD224555D3}" type="presOf" srcId="{43F7F75E-9212-4C27-A5AC-5A9C4A146C1C}" destId="{B095EC76-60D3-45AA-A46D-D3A00073A03B}" srcOrd="0" destOrd="0" presId="urn:microsoft.com/office/officeart/2008/layout/HexagonCluster"/>
+    <dgm:cxn modelId="{3FE2B012-FA6B-49F4-B340-F84305C8F0D3}" type="presOf" srcId="{F42543D4-1290-4352-8728-2D0AB0D96610}" destId="{5D2FD51E-1E92-4CEC-A07A-521A73C46183}" srcOrd="0" destOrd="0" presId="urn:microsoft.com/office/officeart/2008/layout/HexagonCluster"/>
+    <dgm:cxn modelId="{6408F82F-F8EF-497A-B5C6-BB14FAEBE3D1}" srcId="{BB4BAA05-43A2-4654-B874-DB2EA4DEC263}" destId="{26BDA26C-DA63-43A3-9A94-EFAC30646E91}" srcOrd="2" destOrd="0" parTransId="{C203EC0B-B0D3-4277-B1CB-B5FFCA944C41}" sibTransId="{1FC739A1-0545-4DF5-A10D-1E88ECF69537}"/>
+    <dgm:cxn modelId="{3D6CA6D4-10F9-4CE7-AF37-74FD220E763B}" type="presOf" srcId="{1FC739A1-0545-4DF5-A10D-1E88ECF69537}" destId="{D2FB48D5-076B-496F-AC66-5A5D8815B643}" srcOrd="0" destOrd="0" presId="urn:microsoft.com/office/officeart/2008/layout/HexagonCluster"/>
     <dgm:cxn modelId="{3FEE7BAB-9D1B-49B7-8A57-E4619A4C2547}" type="presParOf" srcId="{F65CB6D2-9EE0-4A77-9723-4FF9B2DA763F}" destId="{448B54B7-CC67-4A97-93B9-B87E8F360148}" srcOrd="0" destOrd="0" presId="urn:microsoft.com/office/officeart/2008/layout/HexagonCluster"/>
     <dgm:cxn modelId="{CDDFBD2A-2B37-4621-9192-B6E55751FD88}" type="presParOf" srcId="{448B54B7-CC67-4A97-93B9-B87E8F360148}" destId="{59890D33-F49B-42EA-8B14-B5038E946509}" srcOrd="0" destOrd="0" presId="urn:microsoft.com/office/officeart/2008/layout/HexagonCluster"/>
     <dgm:cxn modelId="{D6431BC0-EAEB-446E-838F-7F8537345C77}" type="presParOf" srcId="{F65CB6D2-9EE0-4A77-9723-4FF9B2DA763F}" destId="{E3984E7A-7464-4FDE-B66B-30F79A57B79B}" srcOrd="1" destOrd="0" presId="urn:microsoft.com/office/officeart/2008/layout/HexagonCluster"/>
@@ -18707,7 +18826,7 @@
           <a:lstStyle/>
           <a:p>
             <a:r>
-              <a:rPr lang="es-UY" sz="3600" b="1" err="1" smtClean="0">
+              <a:rPr lang="es-UY" sz="3200" b="1" err="1" smtClean="0">
                 <a:solidFill>
                   <a:srgbClr val="0070C0"/>
                 </a:solidFill>
@@ -18715,7 +18834,7 @@
               <a:t>Xây</a:t>
             </a:r>
             <a:r>
-              <a:rPr lang="es-UY" sz="3600" b="1" smtClean="0">
+              <a:rPr lang="es-UY" sz="3200" b="1" smtClean="0">
                 <a:solidFill>
                   <a:srgbClr val="0070C0"/>
                 </a:solidFill>
@@ -18723,7 +18842,7 @@
               <a:t> </a:t>
             </a:r>
             <a:r>
-              <a:rPr lang="es-UY" sz="3600" b="1" err="1" smtClean="0">
+              <a:rPr lang="es-UY" sz="3200" b="1" err="1" smtClean="0">
                 <a:solidFill>
                   <a:srgbClr val="0070C0"/>
                 </a:solidFill>
@@ -18731,7 +18850,7 @@
               <a:t>dựng</a:t>
             </a:r>
             <a:r>
-              <a:rPr lang="es-UY" sz="3600" b="1" smtClean="0">
+              <a:rPr lang="es-UY" sz="3200" b="1" smtClean="0">
                 <a:solidFill>
                   <a:srgbClr val="0070C0"/>
                 </a:solidFill>
@@ -18739,7 +18858,7 @@
               <a:t> </a:t>
             </a:r>
             <a:r>
-              <a:rPr lang="es-UY" sz="3600" b="1" err="1" smtClean="0">
+              <a:rPr lang="es-UY" sz="3200" b="1" err="1" smtClean="0">
                 <a:solidFill>
                   <a:srgbClr val="0070C0"/>
                 </a:solidFill>
@@ -18747,7 +18866,7 @@
               <a:t>hệ</a:t>
             </a:r>
             <a:r>
-              <a:rPr lang="es-UY" sz="3600" b="1" smtClean="0">
+              <a:rPr lang="es-UY" sz="3200" b="1" smtClean="0">
                 <a:solidFill>
                   <a:srgbClr val="0070C0"/>
                 </a:solidFill>
@@ -18755,7 +18874,7 @@
               <a:t> </a:t>
             </a:r>
             <a:r>
-              <a:rPr lang="es-UY" sz="3600" b="1" err="1" smtClean="0">
+              <a:rPr lang="es-UY" sz="3200" b="1" err="1" smtClean="0">
                 <a:solidFill>
                   <a:srgbClr val="0070C0"/>
                 </a:solidFill>
@@ -18763,7 +18882,7 @@
               <a:t>thống</a:t>
             </a:r>
             <a:r>
-              <a:rPr lang="es-UY" sz="3600" b="1" smtClean="0">
+              <a:rPr lang="es-UY" sz="3200" b="1" smtClean="0">
                 <a:solidFill>
                   <a:srgbClr val="0070C0"/>
                 </a:solidFill>
@@ -18771,7 +18890,7 @@
               <a:t> </a:t>
             </a:r>
             <a:r>
-              <a:rPr lang="es-UY" sz="3600" b="1" err="1" smtClean="0">
+              <a:rPr lang="es-UY" sz="3200" b="1" err="1" smtClean="0">
                 <a:solidFill>
                   <a:srgbClr val="0070C0"/>
                 </a:solidFill>
@@ -18779,7 +18898,7 @@
               <a:t>thông</a:t>
             </a:r>
             <a:r>
-              <a:rPr lang="es-UY" sz="3600" b="1" smtClean="0">
+              <a:rPr lang="es-UY" sz="3200" b="1" smtClean="0">
                 <a:solidFill>
                   <a:srgbClr val="0070C0"/>
                 </a:solidFill>
@@ -18787,7 +18906,7 @@
               <a:t> </a:t>
             </a:r>
             <a:r>
-              <a:rPr lang="es-UY" sz="3600" b="1" err="1" smtClean="0">
+              <a:rPr lang="es-UY" sz="3200" b="1" err="1" smtClean="0">
                 <a:solidFill>
                   <a:srgbClr val="0070C0"/>
                 </a:solidFill>
@@ -18795,7 +18914,7 @@
               <a:t>tin</a:t>
             </a:r>
             <a:r>
-              <a:rPr lang="es-UY" sz="3600" b="1" smtClean="0">
+              <a:rPr lang="es-UY" sz="3200" b="1" smtClean="0">
                 <a:solidFill>
                   <a:srgbClr val="0070C0"/>
                 </a:solidFill>
@@ -18803,7 +18922,7 @@
               <a:t> </a:t>
             </a:r>
             <a:r>
-              <a:rPr lang="es-UY" sz="3600" b="1" err="1" smtClean="0">
+              <a:rPr lang="es-UY" sz="3200" b="1" err="1" smtClean="0">
                 <a:solidFill>
                   <a:srgbClr val="0070C0"/>
                 </a:solidFill>
@@ -18811,7 +18930,7 @@
               <a:t>địa</a:t>
             </a:r>
             <a:r>
-              <a:rPr lang="es-UY" sz="3600" b="1" smtClean="0">
+              <a:rPr lang="es-UY" sz="3200" b="1" smtClean="0">
                 <a:solidFill>
                   <a:srgbClr val="0070C0"/>
                 </a:solidFill>
@@ -18819,7 +18938,7 @@
               <a:t> </a:t>
             </a:r>
             <a:r>
-              <a:rPr lang="es-UY" sz="3600" b="1" err="1" smtClean="0">
+              <a:rPr lang="es-UY" sz="3200" b="1" err="1" smtClean="0">
                 <a:solidFill>
                   <a:srgbClr val="0070C0"/>
                 </a:solidFill>
@@ -18827,23 +18946,46 @@
               <a:t>lý</a:t>
             </a:r>
             <a:r>
-              <a:rPr lang="es-UY" sz="3600" b="1" smtClean="0">
+              <a:rPr lang="es-UY" sz="3200" b="1" smtClean="0">
                 <a:solidFill>
                   <a:srgbClr val="0070C0"/>
                 </a:solidFill>
               </a:rPr>
-              <a:t> (GIS) </a:t>
-            </a:r>
-            <a:r>
-              <a:rPr lang="es-UY" sz="3600" b="1" err="1" smtClean="0">
+              <a:t> (</a:t>
+            </a:r>
+            <a:r>
+              <a:rPr lang="es-UY" sz="3200" b="1" smtClean="0">
                 <a:solidFill>
                   <a:srgbClr val="0070C0"/>
                 </a:solidFill>
               </a:rPr>
-              <a:t>về</a:t>
-            </a:r>
-            <a:r>
-              <a:rPr lang="es-UY" sz="3600" b="1" smtClean="0">
+              <a:t>GIS)</a:t>
+            </a:r>
+            <a:br>
+              <a:rPr lang="es-UY" sz="3200" b="1" smtClean="0">
+                <a:solidFill>
+                  <a:srgbClr val="0070C0"/>
+                </a:solidFill>
+              </a:rPr>
+            </a:br>
+            <a:r>
+              <a:rPr lang="es-UY" sz="3200" b="1" smtClean="0">
+                <a:solidFill>
+                  <a:srgbClr val="0070C0"/>
+                </a:solidFill>
+              </a:rPr>
+              <a:t>về </a:t>
+            </a:r>
+            <a:r>
+              <a:rPr lang="es-UY" sz="3200" b="1" err="1" smtClean="0">
+                <a:solidFill>
+                  <a:srgbClr val="0070C0"/>
+                </a:solidFill>
+              </a:rPr>
+              <a:t>hạ</a:t>
+            </a:r>
+            <a:r>
+              <a:rPr lang="es-UY" sz="3200" b="1" smtClean="0">
                 <a:solidFill>
                   <a:srgbClr val="0070C0"/>
                 </a:solidFill>
@@ -18851,15 +18993,15 @@
               <a:t> </a:t>
             </a:r>
             <a:r>
-              <a:rPr lang="es-UY" sz="3600" b="1" err="1" smtClean="0">
+              <a:rPr lang="es-UY" sz="3200" b="1" err="1" smtClean="0">
                 <a:solidFill>
                   <a:srgbClr val="0070C0"/>
                 </a:solidFill>
               </a:rPr>
-              <a:t>hạ</a:t>
-            </a:r>
-            <a:r>
-              <a:rPr lang="es-UY" sz="3600" b="1" smtClean="0">
+              <a:t>tầng</a:t>
+            </a:r>
+            <a:r>
+              <a:rPr lang="es-UY" sz="3200" b="1" smtClean="0">
                 <a:solidFill>
                   <a:srgbClr val="0070C0"/>
                 </a:solidFill>
@@ -18867,15 +19009,15 @@
               <a:t> </a:t>
             </a:r>
             <a:r>
-              <a:rPr lang="es-UY" sz="3600" b="1" err="1" smtClean="0">
+              <a:rPr lang="es-UY" sz="3200" b="1" err="1" smtClean="0">
                 <a:solidFill>
                   <a:srgbClr val="0070C0"/>
                 </a:solidFill>
               </a:rPr>
-              <a:t>tầng</a:t>
-            </a:r>
-            <a:r>
-              <a:rPr lang="es-UY" sz="3600" b="1" smtClean="0">
+              <a:t>giao</a:t>
+            </a:r>
+            <a:r>
+              <a:rPr lang="es-UY" sz="3200" b="1" smtClean="0">
                 <a:solidFill>
                   <a:srgbClr val="0070C0"/>
                 </a:solidFill>
@@ -18883,117 +19025,22 @@
               <a:t> </a:t>
             </a:r>
             <a:r>
-              <a:rPr lang="es-UY" sz="3600" b="1" err="1" smtClean="0">
+              <a:rPr lang="es-UY" sz="3200" b="1" smtClean="0">
                 <a:solidFill>
                   <a:srgbClr val="0070C0"/>
                 </a:solidFill>
               </a:rPr>
-              <a:t>giao</a:t>
-            </a:r>
-            <a:r>
-              <a:rPr lang="es-UY" sz="3600" b="1" smtClean="0">
+              <a:t>thông bộ </a:t>
+            </a:r>
+            <a:r>
+              <a:rPr lang="es-UY" sz="3200" b="1" smtClean="0">
                 <a:solidFill>
                   <a:srgbClr val="0070C0"/>
                 </a:solidFill>
               </a:rPr>
-              <a:t> </a:t>
-            </a:r>
-            <a:r>
-              <a:rPr lang="es-UY" sz="3600" b="1" err="1" smtClean="0">
-                <a:solidFill>
-                  <a:srgbClr val="0070C0"/>
-                </a:solidFill>
-              </a:rPr>
-              <a:t>thông</a:t>
-            </a:r>
-            <a:r>
-              <a:rPr lang="es-UY" sz="4000" b="1" smtClean="0">
-                <a:solidFill>
-                  <a:srgbClr val="0070C0"/>
-                </a:solidFill>
-              </a:rPr>
-              <a:t/>
-            </a:r>
-            <a:br>
-              <a:rPr lang="es-UY" sz="4000" b="1" smtClean="0">
-                <a:solidFill>
-                  <a:srgbClr val="0070C0"/>
-                </a:solidFill>
-              </a:rPr>
-            </a:br>
-            <a:r>
-              <a:rPr lang="es-UY" sz="4000" b="1" err="1" smtClean="0">
-                <a:solidFill>
-                  <a:schemeClr val="accent6"/>
-                </a:solidFill>
-              </a:rPr>
-              <a:t>Phân</a:t>
-            </a:r>
-            <a:r>
-              <a:rPr lang="es-UY" sz="4000" b="1" smtClean="0">
-                <a:solidFill>
-                  <a:schemeClr val="accent6"/>
-                </a:solidFill>
-              </a:rPr>
-              <a:t> </a:t>
-            </a:r>
-            <a:r>
-              <a:rPr lang="es-UY" sz="4000" b="1" err="1" smtClean="0">
-                <a:solidFill>
-                  <a:schemeClr val="accent6"/>
-                </a:solidFill>
-              </a:rPr>
-              <a:t>hệ</a:t>
-            </a:r>
-            <a:r>
-              <a:rPr lang="es-UY" sz="4000" b="1" smtClean="0">
-                <a:solidFill>
-                  <a:schemeClr val="accent6"/>
-                </a:solidFill>
-              </a:rPr>
-              <a:t>: </a:t>
-            </a:r>
-            <a:r>
-              <a:rPr lang="es-UY" sz="4000" b="1" err="1" smtClean="0">
-                <a:solidFill>
-                  <a:schemeClr val="accent6"/>
-                </a:solidFill>
-              </a:rPr>
-              <a:t>Giao</a:t>
-            </a:r>
-            <a:r>
-              <a:rPr lang="es-UY" sz="4000" b="1" smtClean="0">
-                <a:solidFill>
-                  <a:schemeClr val="accent6"/>
-                </a:solidFill>
-              </a:rPr>
-              <a:t> </a:t>
-            </a:r>
-            <a:r>
-              <a:rPr lang="es-UY" sz="4000" b="1" err="1" smtClean="0">
-                <a:solidFill>
-                  <a:schemeClr val="accent6"/>
-                </a:solidFill>
-              </a:rPr>
-              <a:t>thông</a:t>
-            </a:r>
-            <a:r>
-              <a:rPr lang="es-UY" sz="4000" b="1" smtClean="0">
-                <a:solidFill>
-                  <a:schemeClr val="accent6"/>
-                </a:solidFill>
-              </a:rPr>
-              <a:t> </a:t>
-            </a:r>
-            <a:r>
-              <a:rPr lang="es-UY" sz="4000" b="1" err="1" smtClean="0">
-                <a:solidFill>
-                  <a:schemeClr val="accent6"/>
-                </a:solidFill>
-              </a:rPr>
-              <a:t>bộ</a:t>
-            </a:r>
-            <a:endParaRPr lang="es-ES" sz="4000" b="1">
+              <a:t>Thành phố Cần Thơ</a:t>
+            </a:r>
+            <a:endParaRPr lang="es-ES" sz="3200" b="1">
               <a:solidFill>
                 <a:schemeClr val="accent6"/>
               </a:solidFill>
@@ -20049,11 +20096,7 @@
             </a:r>
             <a:r>
               <a:rPr lang="vi-VN"/>
-              <a:t>sẻ thông tin về mạng lưới giao thông </a:t>
-            </a:r>
-            <a:r>
-              <a:rPr lang="vi-VN"/>
-              <a:t>đến </a:t>
+              <a:t>sẻ thông tin về mạng lưới giao thông đến </a:t>
             </a:r>
             <a:r>
               <a:rPr lang="vi-VN" smtClean="0"/>
@@ -20176,11 +20219,7 @@
             </a:r>
             <a:r>
               <a:rPr lang="vi-VN"/>
-              <a:t>nhật </a:t>
-            </a:r>
-            <a:r>
-              <a:rPr lang="vi-VN"/>
-              <a:t>dữ </a:t>
+              <a:t>nhật dữ </a:t>
             </a:r>
             <a:r>
               <a:rPr lang="vi-VN" smtClean="0"/>
@@ -20807,15 +20846,7 @@
                   <a:schemeClr val="bg1"/>
                 </a:solidFill>
               </a:rPr>
-              <a:t>Sơ </a:t>
-            </a:r>
-            <a:r>
-              <a:rPr lang="vi-VN" sz="4000" b="1">
-                <a:solidFill>
-                  <a:schemeClr val="bg1"/>
-                </a:solidFill>
-              </a:rPr>
-              <a:t>đồ </a:t>
+              <a:t>Sơ đồ </a:t>
             </a:r>
             <a:r>
               <a:rPr lang="en-US" sz="4000" b="1" smtClean="0">
@@ -21139,17 +21170,8 @@
             <a:pPr algn="just"/>
             <a:r>
               <a:rPr lang="en-US" smtClean="0"/>
-              <a:t>Phần mềm mã nguồn mở là xu hướng lớn </a:t>
-            </a:r>
-            <a:r>
-              <a:rPr lang="en-US" smtClean="0"/>
-              <a:t>hiện nay</a:t>
-            </a:r>
-            <a:r>
-              <a:rPr lang="en-US" smtClean="0"/>
-              <a:t>.</a:t>
-            </a:r>
-            <a:endParaRPr lang="en-US" smtClean="0"/>
+              <a:t>Phần mềm mã nguồn mở là xu hướng lớn hiện nay.</a:t>
+            </a:r>
           </a:p>
           <a:p>
             <a:pPr algn="just"/>
@@ -21264,11 +21286,7 @@
             </a:r>
             <a:r>
               <a:rPr lang="en-US"/>
-              <a:t>và thao tác </a:t>
-            </a:r>
-            <a:r>
-              <a:rPr lang="en-US"/>
-              <a:t>bản </a:t>
+              <a:t>và thao tác bản </a:t>
             </a:r>
             <a:r>
               <a:rPr lang="en-US" smtClean="0"/>
@@ -21283,11 +21301,7 @@
             </a:r>
             <a:r>
               <a:rPr lang="en-US"/>
-              <a:t>kiếm các đối tượng trên </a:t>
-            </a:r>
-            <a:r>
-              <a:rPr lang="en-US"/>
-              <a:t>bản </a:t>
+              <a:t>kiếm các đối tượng trên bản </a:t>
             </a:r>
             <a:r>
               <a:rPr lang="en-US" smtClean="0"/>
@@ -21302,11 +21316,7 @@
             </a:r>
             <a:r>
               <a:rPr lang="en-US"/>
-              <a:t>tin của </a:t>
-            </a:r>
-            <a:r>
-              <a:rPr lang="en-US"/>
-              <a:t>đối </a:t>
+              <a:t>tin của đối </a:t>
             </a:r>
             <a:r>
               <a:rPr lang="en-US" smtClean="0"/>
@@ -21321,11 +21331,7 @@
             </a:r>
             <a:r>
               <a:rPr lang="en-US"/>
-              <a:t>đường đi </a:t>
-            </a:r>
-            <a:r>
-              <a:rPr lang="en-US"/>
-              <a:t>ngắn </a:t>
+              <a:t>đường đi ngắn </a:t>
             </a:r>
             <a:r>
               <a:rPr lang="en-US" smtClean="0"/>
@@ -21340,11 +21346,7 @@
             </a:r>
             <a:r>
               <a:rPr lang="en-US"/>
-              <a:t>khoảng cách, </a:t>
-            </a:r>
-            <a:r>
-              <a:rPr lang="en-US"/>
-              <a:t>diện </a:t>
+              <a:t>khoảng cách, diện </a:t>
             </a:r>
             <a:r>
               <a:rPr lang="en-US" smtClean="0"/>
@@ -21450,11 +21452,7 @@
             <a:pPr lvl="0"/>
             <a:r>
               <a:rPr lang="en-US"/>
-              <a:t>Xuất bản đồ: </a:t>
-            </a:r>
-            <a:r>
-              <a:rPr lang="en-US"/>
-              <a:t>In </a:t>
+              <a:t>Xuất bản đồ: In </a:t>
             </a:r>
             <a:r>
               <a:rPr lang="en-US" smtClean="0"/>
@@ -21474,11 +21472,7 @@
             <a:pPr lvl="0"/>
             <a:r>
               <a:rPr lang="en-US"/>
-              <a:t>Thống kê </a:t>
-            </a:r>
-            <a:r>
-              <a:rPr lang="en-US"/>
-              <a:t>báo </a:t>
+              <a:t>Thống kê báo </a:t>
             </a:r>
             <a:r>
               <a:rPr lang="en-US" smtClean="0"/>
@@ -21497,11 +21491,7 @@
             <a:pPr lvl="0"/>
             <a:r>
               <a:rPr lang="en-US"/>
-              <a:t>Các chức năng </a:t>
-            </a:r>
-            <a:r>
-              <a:rPr lang="en-US"/>
-              <a:t>quản </a:t>
+              <a:t>Các chức năng quản </a:t>
             </a:r>
             <a:r>
               <a:rPr lang="en-US" smtClean="0"/>
@@ -21623,11 +21613,7 @@
             <a:pPr lvl="0"/>
             <a:r>
               <a:rPr lang="vi-VN"/>
-              <a:t>Tính năng tìm </a:t>
-            </a:r>
-            <a:r>
-              <a:rPr lang="vi-VN"/>
-              <a:t>kiếm </a:t>
+              <a:t>Tính năng tìm kiếm </a:t>
             </a:r>
             <a:r>
               <a:rPr lang="en-US" smtClean="0"/>
@@ -21653,11 +21639,7 @@
             </a:r>
             <a:r>
               <a:rPr lang="vi-VN"/>
-              <a:t>tìm được giải pháp để thêm lớp </a:t>
-            </a:r>
-            <a:r>
-              <a:rPr lang="vi-VN"/>
-              <a:t>bản </a:t>
+              <a:t>tìm được giải pháp để thêm lớp bản </a:t>
             </a:r>
             <a:r>
               <a:rPr lang="vi-VN" smtClean="0"/>
@@ -21676,11 +21658,7 @@
             </a:r>
             <a:r>
               <a:rPr lang="en-US"/>
-              <a:t>sẽ thông tin với các sở ban </a:t>
-            </a:r>
-            <a:r>
-              <a:rPr lang="en-US"/>
-              <a:t>ngành </a:t>
+              <a:t>sẽ thông tin với các sở ban ngành </a:t>
             </a:r>
             <a:r>
               <a:rPr lang="en-US" smtClean="0"/>
@@ -21795,11 +21773,7 @@
             </a:r>
             <a:r>
               <a:rPr lang="vi-VN"/>
-              <a:t>các </a:t>
-            </a:r>
-            <a:r>
-              <a:rPr lang="vi-VN"/>
-              <a:t>chức </a:t>
+              <a:t>các chức </a:t>
             </a:r>
             <a:r>
               <a:rPr lang="vi-VN" smtClean="0"/>
@@ -21819,11 +21793,7 @@
             </a:r>
             <a:r>
               <a:rPr lang="vi-VN"/>
-              <a:t>sung thêm một số </a:t>
-            </a:r>
-            <a:r>
-              <a:rPr lang="vi-VN"/>
-              <a:t>chức </a:t>
+              <a:t>sung thêm một số chức </a:t>
             </a:r>
             <a:r>
               <a:rPr lang="vi-VN" smtClean="0"/>
@@ -21838,11 +21808,7 @@
             <a:pPr lvl="0"/>
             <a:r>
               <a:rPr lang="vi-VN"/>
-              <a:t>Bổ sung thêm dữ liệu, các lớp </a:t>
-            </a:r>
-            <a:r>
-              <a:rPr lang="vi-VN"/>
-              <a:t>bản </a:t>
+              <a:t>Bổ sung thêm dữ liệu, các lớp bản </a:t>
             </a:r>
             <a:r>
               <a:rPr lang="vi-VN" smtClean="0"/>
@@ -27464,11 +27430,7 @@
             <a:pPr algn="just"/>
             <a:r>
               <a:rPr lang="vi-VN"/>
-              <a:t>Hiện nay giải pháp </a:t>
-            </a:r>
-            <a:r>
-              <a:rPr lang="vi-VN"/>
-              <a:t>nguồn </a:t>
+              <a:t>Hiện nay giải pháp nguồn </a:t>
             </a:r>
             <a:r>
               <a:rPr lang="vi-VN" smtClean="0"/>
@@ -27476,11 +27438,7 @@
             </a:r>
             <a:r>
               <a:rPr lang="vi-VN"/>
-              <a:t>khá phong phú và </a:t>
-            </a:r>
-            <a:r>
-              <a:rPr lang="vi-VN"/>
-              <a:t>đa </a:t>
+              <a:t>khá phong phú và đa </a:t>
             </a:r>
             <a:r>
               <a:rPr lang="vi-VN" smtClean="0"/>
@@ -27507,11 +27465,7 @@
             </a:r>
             <a:r>
               <a:rPr lang="en-US"/>
-              <a:t>, Map Server</a:t>
-            </a:r>
-            <a:r>
-              <a:rPr lang="en-US"/>
-              <a:t>, </a:t>
+              <a:t>, Map Server, </a:t>
             </a:r>
             <a:r>
               <a:rPr lang="en-US" smtClean="0"/>
@@ -27519,11 +27473,7 @@
             </a:r>
             <a:r>
               <a:rPr lang="en-US"/>
-              <a:t>, deegree</a:t>
-            </a:r>
-            <a:r>
-              <a:rPr lang="en-US"/>
-              <a:t>, </a:t>
+              <a:t>, deegree, </a:t>
             </a:r>
             <a:r>
               <a:rPr lang="en-US" smtClean="0"/>
@@ -27534,11 +27484,7 @@
             <a:pPr algn="just"/>
             <a:r>
               <a:rPr lang="en-US"/>
-              <a:t>Phần mềm phía Client</a:t>
-            </a:r>
-            <a:r>
-              <a:rPr lang="en-US"/>
-              <a:t>: </a:t>
+              <a:t>Phần mềm phía Client: </a:t>
             </a:r>
             <a:r>
               <a:rPr lang="en-US" smtClean="0">
@@ -27550,11 +27496,7 @@
             </a:r>
             <a:r>
               <a:rPr lang="en-US"/>
-              <a:t>, GeoExt</a:t>
-            </a:r>
-            <a:r>
-              <a:rPr lang="en-US"/>
-              <a:t>, </a:t>
+              <a:t>, GeoExt, </a:t>
             </a:r>
             <a:r>
               <a:rPr lang="en-US" smtClean="0"/>
@@ -27565,31 +27507,7 @@
             <a:pPr algn="just"/>
             <a:r>
               <a:rPr lang="en-US"/>
-              <a:t>Phần mềm </a:t>
-            </a:r>
-            <a:r>
-              <a:rPr lang="en-US"/>
-              <a:t>Desktop: </a:t>
-            </a:r>
-            <a:r>
-              <a:rPr lang="en-US"/>
-              <a:t>GRASS, </a:t>
-            </a:r>
-            <a:r>
-              <a:rPr lang="en-US"/>
-              <a:t>Quantum </a:t>
-            </a:r>
-            <a:r>
-              <a:rPr lang="en-US"/>
-              <a:t>GIS</a:t>
-            </a:r>
-            <a:r>
-              <a:rPr lang="en-US"/>
-              <a:t>, </a:t>
-            </a:r>
-            <a:r>
-              <a:rPr lang="en-US"/>
-              <a:t>uDIG, </a:t>
+              <a:t>Phần mềm Desktop: GRASS, Quantum GIS, uDIG, </a:t>
             </a:r>
             <a:r>
               <a:rPr lang="en-US">

</xml_diff>

<commit_message>
Sửa báo cáo theo hội đồng lần 2. Còn tinh gọn Cơ sở lý thuyết, mô tả hình, lưu đồ
</commit_message>
<xml_diff>
--- a/Reports/Presentation.pptx
+++ b/Reports/Presentation.pptx
@@ -3340,18 +3340,18 @@
     </dgm:pt>
   </dgm:ptLst>
   <dgm:cxnLst>
+    <dgm:cxn modelId="{0E171844-3223-4F79-83A5-BEA6216626B1}" type="presOf" srcId="{125551CD-A054-45BD-AE5C-3D212C3D8526}" destId="{1FEABB09-25A5-432F-9911-10478EF95599}" srcOrd="0" destOrd="0" presId="urn:microsoft.com/office/officeart/2005/8/layout/radial4"/>
+    <dgm:cxn modelId="{9A6104FE-0B48-408A-B043-3491E7E89D04}" srcId="{97A8CF2D-F3D1-42DB-802A-011413263594}" destId="{480DCC3E-0D26-4CE3-BE9D-AB2E29DAAECF}" srcOrd="0" destOrd="0" parTransId="{125551CD-A054-45BD-AE5C-3D212C3D8526}" sibTransId="{45BD0C8D-D577-4D14-BD44-831788EC63C0}"/>
+    <dgm:cxn modelId="{76333900-AD73-4591-B887-5088FDD7DB80}" type="presOf" srcId="{480DCC3E-0D26-4CE3-BE9D-AB2E29DAAECF}" destId="{C92C280C-2205-4306-82DF-4CA179D8E44F}" srcOrd="0" destOrd="0" presId="urn:microsoft.com/office/officeart/2005/8/layout/radial4"/>
+    <dgm:cxn modelId="{C679C330-68F0-4FBB-BE8E-396D89A4C361}" type="presOf" srcId="{B3A8031C-49C3-48B3-A3AC-00F29EFAA4F9}" destId="{3F7D9CE9-7E06-47BE-B403-D8E7FB7AB796}" srcOrd="0" destOrd="0" presId="urn:microsoft.com/office/officeart/2005/8/layout/radial4"/>
+    <dgm:cxn modelId="{967B96D3-8F28-4387-B2D3-8BCCD603B8B2}" srcId="{B3A8031C-49C3-48B3-A3AC-00F29EFAA4F9}" destId="{97A8CF2D-F3D1-42DB-802A-011413263594}" srcOrd="0" destOrd="0" parTransId="{FFA0F785-BF69-4BA2-9579-D3AE3EEEC425}" sibTransId="{C9822A57-00E0-4B78-88B5-BD433A53D534}"/>
     <dgm:cxn modelId="{4903B02D-5621-4BA9-B581-7B8AAD731449}" type="presOf" srcId="{9150135A-D080-43BD-B251-1034FC04A45E}" destId="{88511A48-A615-49FE-9DD2-D3313D7B4BD0}" srcOrd="0" destOrd="0" presId="urn:microsoft.com/office/officeart/2005/8/layout/radial4"/>
     <dgm:cxn modelId="{A384CC07-906C-43CA-9498-818142B85801}" srcId="{97A8CF2D-F3D1-42DB-802A-011413263594}" destId="{ECB4FBAF-2471-4663-B765-BAF056C4784D}" srcOrd="2" destOrd="0" parTransId="{575CA7F4-7741-4027-BBE0-0E43B46020D7}" sibTransId="{704F112D-BFA4-4BEE-BE3D-F941BF0A7DB3}"/>
+    <dgm:cxn modelId="{112D801D-B3BA-4E10-8225-86ED989596DB}" type="presOf" srcId="{ECB4FBAF-2471-4663-B765-BAF056C4784D}" destId="{DBE4DC52-6236-41D9-AD06-5D1262CDAD0C}" srcOrd="0" destOrd="0" presId="urn:microsoft.com/office/officeart/2005/8/layout/radial4"/>
     <dgm:cxn modelId="{29208011-F73A-4E3F-BEFD-5855BB658293}" type="presOf" srcId="{4BDC7673-A42C-4621-9399-616535236CC8}" destId="{C3F546A9-636E-412E-8201-0B638FB5B99B}" srcOrd="0" destOrd="0" presId="urn:microsoft.com/office/officeart/2005/8/layout/radial4"/>
-    <dgm:cxn modelId="{112D801D-B3BA-4E10-8225-86ED989596DB}" type="presOf" srcId="{ECB4FBAF-2471-4663-B765-BAF056C4784D}" destId="{DBE4DC52-6236-41D9-AD06-5D1262CDAD0C}" srcOrd="0" destOrd="0" presId="urn:microsoft.com/office/officeart/2005/8/layout/radial4"/>
+    <dgm:cxn modelId="{BECDFC7A-3779-4B16-9F23-EA40470FFBFD}" type="presOf" srcId="{575CA7F4-7741-4027-BBE0-0E43B46020D7}" destId="{4A1E67AE-D3D8-4DE3-B74F-BA402934B99D}" srcOrd="0" destOrd="0" presId="urn:microsoft.com/office/officeart/2005/8/layout/radial4"/>
     <dgm:cxn modelId="{281649F7-BE1F-4B56-B1DA-591E6B37A9FB}" srcId="{97A8CF2D-F3D1-42DB-802A-011413263594}" destId="{4BDC7673-A42C-4621-9399-616535236CC8}" srcOrd="1" destOrd="0" parTransId="{9150135A-D080-43BD-B251-1034FC04A45E}" sibTransId="{2463F12D-E9D1-4F93-A1DC-C7A0FB5484AB}"/>
-    <dgm:cxn modelId="{76333900-AD73-4591-B887-5088FDD7DB80}" type="presOf" srcId="{480DCC3E-0D26-4CE3-BE9D-AB2E29DAAECF}" destId="{C92C280C-2205-4306-82DF-4CA179D8E44F}" srcOrd="0" destOrd="0" presId="urn:microsoft.com/office/officeart/2005/8/layout/radial4"/>
-    <dgm:cxn modelId="{BECDFC7A-3779-4B16-9F23-EA40470FFBFD}" type="presOf" srcId="{575CA7F4-7741-4027-BBE0-0E43B46020D7}" destId="{4A1E67AE-D3D8-4DE3-B74F-BA402934B99D}" srcOrd="0" destOrd="0" presId="urn:microsoft.com/office/officeart/2005/8/layout/radial4"/>
     <dgm:cxn modelId="{CDED937D-D669-4E80-A21D-179B8AC1E217}" type="presOf" srcId="{97A8CF2D-F3D1-42DB-802A-011413263594}" destId="{B8F6A591-8DF1-4CCC-B12C-A99C8B3FEFAB}" srcOrd="0" destOrd="0" presId="urn:microsoft.com/office/officeart/2005/8/layout/radial4"/>
-    <dgm:cxn modelId="{0E171844-3223-4F79-83A5-BEA6216626B1}" type="presOf" srcId="{125551CD-A054-45BD-AE5C-3D212C3D8526}" destId="{1FEABB09-25A5-432F-9911-10478EF95599}" srcOrd="0" destOrd="0" presId="urn:microsoft.com/office/officeart/2005/8/layout/radial4"/>
-    <dgm:cxn modelId="{C679C330-68F0-4FBB-BE8E-396D89A4C361}" type="presOf" srcId="{B3A8031C-49C3-48B3-A3AC-00F29EFAA4F9}" destId="{3F7D9CE9-7E06-47BE-B403-D8E7FB7AB796}" srcOrd="0" destOrd="0" presId="urn:microsoft.com/office/officeart/2005/8/layout/radial4"/>
-    <dgm:cxn modelId="{967B96D3-8F28-4387-B2D3-8BCCD603B8B2}" srcId="{B3A8031C-49C3-48B3-A3AC-00F29EFAA4F9}" destId="{97A8CF2D-F3D1-42DB-802A-011413263594}" srcOrd="0" destOrd="0" parTransId="{FFA0F785-BF69-4BA2-9579-D3AE3EEEC425}" sibTransId="{C9822A57-00E0-4B78-88B5-BD433A53D534}"/>
-    <dgm:cxn modelId="{9A6104FE-0B48-408A-B043-3491E7E89D04}" srcId="{97A8CF2D-F3D1-42DB-802A-011413263594}" destId="{480DCC3E-0D26-4CE3-BE9D-AB2E29DAAECF}" srcOrd="0" destOrd="0" parTransId="{125551CD-A054-45BD-AE5C-3D212C3D8526}" sibTransId="{45BD0C8D-D577-4D14-BD44-831788EC63C0}"/>
     <dgm:cxn modelId="{95974D2C-32CE-4EE7-A875-7A0218124DE6}" type="presParOf" srcId="{3F7D9CE9-7E06-47BE-B403-D8E7FB7AB796}" destId="{B8F6A591-8DF1-4CCC-B12C-A99C8B3FEFAB}" srcOrd="0" destOrd="0" presId="urn:microsoft.com/office/officeart/2005/8/layout/radial4"/>
     <dgm:cxn modelId="{49D60D19-06D4-4986-98EA-2F4CFC219251}" type="presParOf" srcId="{3F7D9CE9-7E06-47BE-B403-D8E7FB7AB796}" destId="{1FEABB09-25A5-432F-9911-10478EF95599}" srcOrd="1" destOrd="0" presId="urn:microsoft.com/office/officeart/2005/8/layout/radial4"/>
     <dgm:cxn modelId="{46F37375-336F-4968-811C-CE668FC97E92}" type="presParOf" srcId="{3F7D9CE9-7E06-47BE-B403-D8E7FB7AB796}" destId="{C92C280C-2205-4306-82DF-4CA179D8E44F}" srcOrd="2" destOrd="0" presId="urn:microsoft.com/office/officeart/2005/8/layout/radial4"/>
@@ -12312,7 +12312,7 @@
           <a:p>
             <a:fld id="{CB6F56A9-B455-4184-8F8C-F88AA7946CB5}" type="datetimeFigureOut">
               <a:rPr lang="en-US" smtClean="0"/>
-              <a:t>5/6/2012</a:t>
+              <a:t>5/9/2012</a:t>
             </a:fld>
             <a:endParaRPr lang="en-US"/>
           </a:p>
@@ -18951,15 +18951,7 @@
                   <a:srgbClr val="0070C0"/>
                 </a:solidFill>
               </a:rPr>
-              <a:t> (</a:t>
-            </a:r>
-            <a:r>
-              <a:rPr lang="es-UY" sz="3200" b="1" smtClean="0">
-                <a:solidFill>
-                  <a:srgbClr val="0070C0"/>
-                </a:solidFill>
-              </a:rPr>
-              <a:t>GIS)</a:t>
+              <a:t> (GIS)</a:t>
             </a:r>
             <a:br>
               <a:rPr lang="es-UY" sz="3200" b="1" smtClean="0">
@@ -19022,23 +19014,7 @@
                   <a:srgbClr val="0070C0"/>
                 </a:solidFill>
               </a:rPr>
-              <a:t> </a:t>
-            </a:r>
-            <a:r>
-              <a:rPr lang="es-UY" sz="3200" b="1" smtClean="0">
-                <a:solidFill>
-                  <a:srgbClr val="0070C0"/>
-                </a:solidFill>
-              </a:rPr>
-              <a:t>thông bộ </a:t>
-            </a:r>
-            <a:r>
-              <a:rPr lang="es-UY" sz="3200" b="1" smtClean="0">
-                <a:solidFill>
-                  <a:srgbClr val="0070C0"/>
-                </a:solidFill>
-              </a:rPr>
-              <a:t>Thành phố Cần Thơ</a:t>
+              <a:t> thông bộ Thành phố Cần Thơ</a:t>
             </a:r>
             <a:endParaRPr lang="es-ES" sz="3200" b="1">
               <a:solidFill>
@@ -20866,7 +20842,7 @@
       </p:sp>
       <p:pic>
         <p:nvPicPr>
-          <p:cNvPr id="5122" name="Picture 2"/>
+          <p:cNvPr id="1026" name="Picture 2"/>
           <p:cNvPicPr>
             <a:picLocks noChangeAspect="1" noChangeArrowheads="1"/>
           </p:cNvPicPr>
@@ -20887,8 +20863,8 @@
         </p:blipFill>
         <p:spPr bwMode="auto">
           <a:xfrm>
-            <a:off x="190681" y="732909"/>
-            <a:ext cx="8762638" cy="5896491"/>
+            <a:off x="242888" y="685800"/>
+            <a:ext cx="8656637" cy="5976937"/>
           </a:xfrm>
           <a:prstGeom prst="rect">
             <a:avLst/>

</xml_diff>